<commit_message>
add details to first slide of Data Network poster
</commit_message>
<xml_diff>
--- a/Victorian-Data-Conference/Wisnicki-Fieldwork_of_Empire-poster.pptx
+++ b/Victorian-Data-Conference/Wisnicki-Fieldwork_of_Empire-poster.pptx
@@ -3301,8 +3301,8 @@
         </p:nvSpPr>
         <p:spPr>
           <a:xfrm>
-            <a:off x="1694688" y="1825625"/>
-            <a:ext cx="5608320" cy="3185287"/>
+            <a:off x="1767840" y="1216025"/>
+            <a:ext cx="5608320" cy="4124071"/>
           </a:xfrm>
         </p:spPr>
         <p:txBody>
@@ -3327,17 +3327,39 @@
             </a:r>
             <a:r>
               <a:rPr lang="en-US" sz="1800"/>
-              <a:t> website, under a Creative Commons Attribution-NonCommercial 4.0 International (CC BY-NC 4.0) license (</a:t>
+              <a:t> website (</a:t>
             </a:r>
             <a:r>
               <a:rPr lang="en-US" sz="1800">
                 <a:hlinkClick r:id="rId2"/>
               </a:rPr>
+              <a:t>https://awisnicki.github.io/fieldwork_of_empire/index.html</a:t>
+            </a:r>
+            <a:r>
+              <a:rPr lang="en-US" sz="1800"/>
+              <a:t>), under a Creative Commons Attribution-NonCommercial 4.0 International (CC BY-NC 4.0) license (</a:t>
+            </a:r>
+            <a:r>
+              <a:rPr lang="en-US" sz="1800">
+                <a:hlinkClick r:id="rId3"/>
+              </a:rPr>
               <a:t>https://creativecommons.org/licenses/by-nc/4.0/</a:t>
             </a:r>
             <a:r>
               <a:rPr lang="en-US" sz="1800"/>
               <a:t>). Please feel free to reuse the material that follows in any way that suits you. Please just be sure to attribute it properly per the terms of the license.</a:t>
+            </a:r>
+          </a:p>
+          <a:p>
+            <a:pPr marL="0" indent="0" algn="r">
+              <a:lnSpc>
+                <a:spcPct val="150000"/>
+              </a:lnSpc>
+              <a:buNone/>
+            </a:pPr>
+            <a:r>
+              <a:rPr lang="en-US" sz="1800"/>
+              <a:t>Adrian S. Wisnicki (U. Nebraska-Lincoln, awisnicki@yahoo.com)</a:t>
             </a:r>
           </a:p>
         </p:txBody>

</xml_diff>